<commit_message>
New images and slides for Aktores intro
</commit_message>
<xml_diff>
--- a/AktoresIntro/images/AktoresIntro.pptx
+++ b/AktoresIntro/images/AktoresIntro.pptx
@@ -6,6 +6,8 @@
   </p:sldMasterIdLst>
   <p:sldIdLst>
     <p:sldId id="256" r:id="rId2"/>
+    <p:sldId id="257" r:id="rId3"/>
+    <p:sldId id="258" r:id="rId4"/>
   </p:sldIdLst>
   <p:sldSz cx="9144000" cy="6858000" type="screen4x3"/>
   <p:notesSz cx="6858000" cy="9144000"/>
@@ -3754,6 +3756,965 @@
           <a:xfrm flipV="1">
             <a:off x="1457818" y="1752600"/>
             <a:ext cx="561482" cy="533400"/>
+          </a:xfrm>
+          <a:prstGeom prst="straightConnector1">
+            <a:avLst/>
+          </a:prstGeom>
+          <a:ln>
+            <a:tailEnd type="arrow"/>
+          </a:ln>
+        </p:spPr>
+        <p:style>
+          <a:lnRef idx="1">
+            <a:schemeClr val="accent1"/>
+          </a:lnRef>
+          <a:fillRef idx="0">
+            <a:schemeClr val="accent1"/>
+          </a:fillRef>
+          <a:effectRef idx="0">
+            <a:schemeClr val="accent1"/>
+          </a:effectRef>
+          <a:fontRef idx="minor">
+            <a:schemeClr val="tx1"/>
+          </a:fontRef>
+        </p:style>
+      </p:cxnSp>
+    </p:spTree>
+  </p:cSld>
+  <p:clrMapOvr>
+    <a:masterClrMapping/>
+  </p:clrMapOvr>
+</p:sld>
+</file>
+
+<file path=ppt/slides/slide2.xml><?xml version="1.0" encoding="utf-8"?>
+<p:sld xmlns:a="http://schemas.openxmlformats.org/drawingml/2006/main" xmlns:r="http://schemas.openxmlformats.org/officeDocument/2006/relationships" xmlns:p="http://schemas.openxmlformats.org/presentationml/2006/main">
+  <p:cSld>
+    <p:spTree>
+      <p:nvGrpSpPr>
+        <p:cNvPr id="1" name=""/>
+        <p:cNvGrpSpPr/>
+        <p:nvPr/>
+      </p:nvGrpSpPr>
+      <p:grpSpPr>
+        <a:xfrm>
+          <a:off x="0" y="0"/>
+          <a:ext cx="0" cy="0"/>
+          <a:chOff x="0" y="0"/>
+          <a:chExt cx="0" cy="0"/>
+        </a:xfrm>
+      </p:grpSpPr>
+      <p:sp>
+        <p:nvSpPr>
+          <p:cNvPr id="2" name="1 Rectángulo redondeado"/>
+          <p:cNvSpPr/>
+          <p:nvPr/>
+        </p:nvSpPr>
+        <p:spPr>
+          <a:xfrm>
+            <a:off x="762000" y="1524000"/>
+            <a:ext cx="1524000" cy="685801"/>
+          </a:xfrm>
+          <a:prstGeom prst="roundRect">
+            <a:avLst/>
+          </a:prstGeom>
+          <a:solidFill>
+            <a:schemeClr val="accent3">
+              <a:lumMod val="40000"/>
+              <a:lumOff val="60000"/>
+            </a:schemeClr>
+          </a:solidFill>
+        </p:spPr>
+        <p:style>
+          <a:lnRef idx="1">
+            <a:schemeClr val="accent3"/>
+          </a:lnRef>
+          <a:fillRef idx="2">
+            <a:schemeClr val="accent3"/>
+          </a:fillRef>
+          <a:effectRef idx="1">
+            <a:schemeClr val="accent3"/>
+          </a:effectRef>
+          <a:fontRef idx="minor">
+            <a:schemeClr val="dk1"/>
+          </a:fontRef>
+        </p:style>
+        <p:txBody>
+          <a:bodyPr rtlCol="0" anchor="ctr"/>
+          <a:lstStyle/>
+          <a:p>
+            <a:pPr algn="ctr"/>
+            <a:r>
+              <a:rPr lang="en-US" dirty="0" smtClean="0"/>
+              <a:t>actor1</a:t>
+            </a:r>
+            <a:endParaRPr lang="en-US" dirty="0"/>
+          </a:p>
+        </p:txBody>
+      </p:sp>
+      <p:sp>
+        <p:nvSpPr>
+          <p:cNvPr id="3" name="2 Rectángulo redondeado"/>
+          <p:cNvSpPr/>
+          <p:nvPr/>
+        </p:nvSpPr>
+        <p:spPr>
+          <a:xfrm>
+            <a:off x="3048000" y="2743200"/>
+            <a:ext cx="1524000" cy="685801"/>
+          </a:xfrm>
+          <a:prstGeom prst="roundRect">
+            <a:avLst/>
+          </a:prstGeom>
+          <a:solidFill>
+            <a:schemeClr val="accent3">
+              <a:lumMod val="40000"/>
+              <a:lumOff val="60000"/>
+            </a:schemeClr>
+          </a:solidFill>
+        </p:spPr>
+        <p:style>
+          <a:lnRef idx="1">
+            <a:schemeClr val="accent3"/>
+          </a:lnRef>
+          <a:fillRef idx="2">
+            <a:schemeClr val="accent3"/>
+          </a:fillRef>
+          <a:effectRef idx="1">
+            <a:schemeClr val="accent3"/>
+          </a:effectRef>
+          <a:fontRef idx="minor">
+            <a:schemeClr val="dk1"/>
+          </a:fontRef>
+        </p:style>
+        <p:txBody>
+          <a:bodyPr rtlCol="0" anchor="ctr"/>
+          <a:lstStyle/>
+          <a:p>
+            <a:pPr algn="ctr"/>
+            <a:r>
+              <a:rPr lang="en-US" dirty="0" smtClean="0"/>
+              <a:t>actor2</a:t>
+            </a:r>
+            <a:endParaRPr lang="en-US" dirty="0"/>
+          </a:p>
+        </p:txBody>
+      </p:sp>
+      <p:sp>
+        <p:nvSpPr>
+          <p:cNvPr id="4" name="3 Rectángulo redondeado"/>
+          <p:cNvSpPr/>
+          <p:nvPr/>
+        </p:nvSpPr>
+        <p:spPr>
+          <a:xfrm>
+            <a:off x="6477000" y="2590800"/>
+            <a:ext cx="1524000" cy="685801"/>
+          </a:xfrm>
+          <a:prstGeom prst="roundRect">
+            <a:avLst/>
+          </a:prstGeom>
+          <a:solidFill>
+            <a:schemeClr val="accent3">
+              <a:lumMod val="40000"/>
+              <a:lumOff val="60000"/>
+            </a:schemeClr>
+          </a:solidFill>
+        </p:spPr>
+        <p:style>
+          <a:lnRef idx="1">
+            <a:schemeClr val="accent3"/>
+          </a:lnRef>
+          <a:fillRef idx="2">
+            <a:schemeClr val="accent3"/>
+          </a:fillRef>
+          <a:effectRef idx="1">
+            <a:schemeClr val="accent3"/>
+          </a:effectRef>
+          <a:fontRef idx="minor">
+            <a:schemeClr val="dk1"/>
+          </a:fontRef>
+        </p:style>
+        <p:txBody>
+          <a:bodyPr rtlCol="0" anchor="ctr"/>
+          <a:lstStyle/>
+          <a:p>
+            <a:pPr algn="ctr"/>
+            <a:r>
+              <a:rPr lang="en-US" dirty="0" smtClean="0"/>
+              <a:t>actor3</a:t>
+            </a:r>
+            <a:endParaRPr lang="en-US" dirty="0"/>
+          </a:p>
+        </p:txBody>
+      </p:sp>
+      <p:cxnSp>
+        <p:nvCxnSpPr>
+          <p:cNvPr id="6" name="5 Conector recto de flecha"/>
+          <p:cNvCxnSpPr>
+            <a:stCxn id="2" idx="2"/>
+            <a:endCxn id="3" idx="1"/>
+          </p:cNvCxnSpPr>
+          <p:nvPr/>
+        </p:nvCxnSpPr>
+        <p:spPr>
+          <a:xfrm>
+            <a:off x="1524000" y="2209801"/>
+            <a:ext cx="1524000" cy="876300"/>
+          </a:xfrm>
+          <a:prstGeom prst="straightConnector1">
+            <a:avLst/>
+          </a:prstGeom>
+          <a:ln>
+            <a:tailEnd type="arrow"/>
+          </a:ln>
+        </p:spPr>
+        <p:style>
+          <a:lnRef idx="1">
+            <a:schemeClr val="accent1"/>
+          </a:lnRef>
+          <a:fillRef idx="0">
+            <a:schemeClr val="accent1"/>
+          </a:fillRef>
+          <a:effectRef idx="0">
+            <a:schemeClr val="accent1"/>
+          </a:effectRef>
+          <a:fontRef idx="minor">
+            <a:schemeClr val="tx1"/>
+          </a:fontRef>
+        </p:style>
+      </p:cxnSp>
+      <p:cxnSp>
+        <p:nvCxnSpPr>
+          <p:cNvPr id="8" name="7 Conector recto de flecha"/>
+          <p:cNvCxnSpPr>
+            <a:stCxn id="3" idx="3"/>
+            <a:endCxn id="4" idx="1"/>
+          </p:cNvCxnSpPr>
+          <p:nvPr/>
+        </p:nvCxnSpPr>
+        <p:spPr>
+          <a:xfrm flipV="1">
+            <a:off x="4572000" y="2933701"/>
+            <a:ext cx="1905000" cy="152400"/>
+          </a:xfrm>
+          <a:prstGeom prst="straightConnector1">
+            <a:avLst/>
+          </a:prstGeom>
+          <a:ln>
+            <a:tailEnd type="arrow"/>
+          </a:ln>
+        </p:spPr>
+        <p:style>
+          <a:lnRef idx="1">
+            <a:schemeClr val="accent1"/>
+          </a:lnRef>
+          <a:fillRef idx="0">
+            <a:schemeClr val="accent1"/>
+          </a:fillRef>
+          <a:effectRef idx="0">
+            <a:schemeClr val="accent1"/>
+          </a:effectRef>
+          <a:fontRef idx="minor">
+            <a:schemeClr val="tx1"/>
+          </a:fontRef>
+        </p:style>
+      </p:cxnSp>
+      <p:sp>
+        <p:nvSpPr>
+          <p:cNvPr id="9" name="8 Elipse"/>
+          <p:cNvSpPr/>
+          <p:nvPr/>
+        </p:nvSpPr>
+        <p:spPr>
+          <a:xfrm>
+            <a:off x="2057400" y="2438400"/>
+            <a:ext cx="228600" cy="228600"/>
+          </a:xfrm>
+          <a:prstGeom prst="ellipse">
+            <a:avLst/>
+          </a:prstGeom>
+          <a:solidFill>
+            <a:schemeClr val="accent6">
+              <a:lumMod val="75000"/>
+            </a:schemeClr>
+          </a:solidFill>
+        </p:spPr>
+        <p:style>
+          <a:lnRef idx="2">
+            <a:schemeClr val="accent1">
+              <a:shade val="50000"/>
+            </a:schemeClr>
+          </a:lnRef>
+          <a:fillRef idx="1">
+            <a:schemeClr val="accent1"/>
+          </a:fillRef>
+          <a:effectRef idx="0">
+            <a:schemeClr val="accent1"/>
+          </a:effectRef>
+          <a:fontRef idx="minor">
+            <a:schemeClr val="lt1"/>
+          </a:fontRef>
+        </p:style>
+        <p:txBody>
+          <a:bodyPr rtlCol="0" anchor="ctr"/>
+          <a:lstStyle/>
+          <a:p>
+            <a:pPr algn="ctr"/>
+            <a:endParaRPr lang="en-US"/>
+          </a:p>
+        </p:txBody>
+      </p:sp>
+      <p:sp>
+        <p:nvSpPr>
+          <p:cNvPr id="10" name="9 Elipse"/>
+          <p:cNvSpPr/>
+          <p:nvPr/>
+        </p:nvSpPr>
+        <p:spPr>
+          <a:xfrm>
+            <a:off x="5334000" y="2895600"/>
+            <a:ext cx="228600" cy="228600"/>
+          </a:xfrm>
+          <a:prstGeom prst="ellipse">
+            <a:avLst/>
+          </a:prstGeom>
+          <a:solidFill>
+            <a:schemeClr val="accent6">
+              <a:lumMod val="75000"/>
+            </a:schemeClr>
+          </a:solidFill>
+        </p:spPr>
+        <p:style>
+          <a:lnRef idx="2">
+            <a:schemeClr val="accent1">
+              <a:shade val="50000"/>
+            </a:schemeClr>
+          </a:lnRef>
+          <a:fillRef idx="1">
+            <a:schemeClr val="accent1"/>
+          </a:fillRef>
+          <a:effectRef idx="0">
+            <a:schemeClr val="accent1"/>
+          </a:effectRef>
+          <a:fontRef idx="minor">
+            <a:schemeClr val="lt1"/>
+          </a:fontRef>
+        </p:style>
+        <p:txBody>
+          <a:bodyPr rtlCol="0" anchor="ctr"/>
+          <a:lstStyle/>
+          <a:p>
+            <a:pPr algn="ctr"/>
+            <a:endParaRPr lang="en-US"/>
+          </a:p>
+        </p:txBody>
+      </p:sp>
+      <p:sp>
+        <p:nvSpPr>
+          <p:cNvPr id="11" name="10 CuadroTexto"/>
+          <p:cNvSpPr txBox="1"/>
+          <p:nvPr/>
+        </p:nvSpPr>
+        <p:spPr>
+          <a:xfrm>
+            <a:off x="1295400" y="2667000"/>
+            <a:ext cx="997068" cy="369332"/>
+          </a:xfrm>
+          <a:prstGeom prst="rect">
+            <a:avLst/>
+          </a:prstGeom>
+          <a:noFill/>
+        </p:spPr>
+        <p:txBody>
+          <a:bodyPr wrap="none" rtlCol="0">
+            <a:spAutoFit/>
+          </a:bodyPr>
+          <a:lstStyle/>
+          <a:p>
+            <a:r>
+              <a:rPr lang="en-US" dirty="0" smtClean="0"/>
+              <a:t>message</a:t>
+            </a:r>
+            <a:endParaRPr lang="en-US" dirty="0"/>
+          </a:p>
+        </p:txBody>
+      </p:sp>
+      <p:sp>
+        <p:nvSpPr>
+          <p:cNvPr id="12" name="11 CuadroTexto"/>
+          <p:cNvSpPr txBox="1"/>
+          <p:nvPr/>
+        </p:nvSpPr>
+        <p:spPr>
+          <a:xfrm>
+            <a:off x="4953000" y="3124200"/>
+            <a:ext cx="997068" cy="369332"/>
+          </a:xfrm>
+          <a:prstGeom prst="rect">
+            <a:avLst/>
+          </a:prstGeom>
+          <a:noFill/>
+        </p:spPr>
+        <p:txBody>
+          <a:bodyPr wrap="none" rtlCol="0">
+            <a:spAutoFit/>
+          </a:bodyPr>
+          <a:lstStyle/>
+          <a:p>
+            <a:r>
+              <a:rPr lang="en-US" dirty="0" smtClean="0"/>
+              <a:t>message</a:t>
+            </a:r>
+            <a:endParaRPr lang="en-US" dirty="0"/>
+          </a:p>
+        </p:txBody>
+      </p:sp>
+      <p:sp>
+        <p:nvSpPr>
+          <p:cNvPr id="13" name="12 Rectángulo redondeado"/>
+          <p:cNvSpPr/>
+          <p:nvPr/>
+        </p:nvSpPr>
+        <p:spPr>
+          <a:xfrm>
+            <a:off x="4038600" y="838200"/>
+            <a:ext cx="1524000" cy="685801"/>
+          </a:xfrm>
+          <a:prstGeom prst="roundRect">
+            <a:avLst/>
+          </a:prstGeom>
+          <a:solidFill>
+            <a:schemeClr val="accent3">
+              <a:lumMod val="40000"/>
+              <a:lumOff val="60000"/>
+            </a:schemeClr>
+          </a:solidFill>
+        </p:spPr>
+        <p:style>
+          <a:lnRef idx="1">
+            <a:schemeClr val="accent3"/>
+          </a:lnRef>
+          <a:fillRef idx="2">
+            <a:schemeClr val="accent3"/>
+          </a:fillRef>
+          <a:effectRef idx="1">
+            <a:schemeClr val="accent3"/>
+          </a:effectRef>
+          <a:fontRef idx="minor">
+            <a:schemeClr val="dk1"/>
+          </a:fontRef>
+        </p:style>
+        <p:txBody>
+          <a:bodyPr rtlCol="0" anchor="ctr"/>
+          <a:lstStyle/>
+          <a:p>
+            <a:pPr algn="ctr"/>
+            <a:r>
+              <a:rPr lang="en-US" dirty="0" smtClean="0"/>
+              <a:t>actor4</a:t>
+            </a:r>
+            <a:endParaRPr lang="en-US" dirty="0"/>
+          </a:p>
+        </p:txBody>
+      </p:sp>
+      <p:cxnSp>
+        <p:nvCxnSpPr>
+          <p:cNvPr id="14" name="13 Conector recto de flecha"/>
+          <p:cNvCxnSpPr>
+            <a:stCxn id="3" idx="0"/>
+            <a:endCxn id="13" idx="2"/>
+          </p:cNvCxnSpPr>
+          <p:nvPr/>
+        </p:nvCxnSpPr>
+        <p:spPr>
+          <a:xfrm flipV="1">
+            <a:off x="3810000" y="1524001"/>
+            <a:ext cx="990600" cy="1219199"/>
+          </a:xfrm>
+          <a:prstGeom prst="straightConnector1">
+            <a:avLst/>
+          </a:prstGeom>
+          <a:ln>
+            <a:tailEnd type="arrow"/>
+          </a:ln>
+        </p:spPr>
+        <p:style>
+          <a:lnRef idx="1">
+            <a:schemeClr val="accent1"/>
+          </a:lnRef>
+          <a:fillRef idx="0">
+            <a:schemeClr val="accent1"/>
+          </a:fillRef>
+          <a:effectRef idx="0">
+            <a:schemeClr val="accent1"/>
+          </a:effectRef>
+          <a:fontRef idx="minor">
+            <a:schemeClr val="tx1"/>
+          </a:fontRef>
+        </p:style>
+      </p:cxnSp>
+      <p:sp>
+        <p:nvSpPr>
+          <p:cNvPr id="17" name="16 Elipse"/>
+          <p:cNvSpPr/>
+          <p:nvPr/>
+        </p:nvSpPr>
+        <p:spPr>
+          <a:xfrm>
+            <a:off x="4191000" y="1981200"/>
+            <a:ext cx="228600" cy="228600"/>
+          </a:xfrm>
+          <a:prstGeom prst="ellipse">
+            <a:avLst/>
+          </a:prstGeom>
+          <a:solidFill>
+            <a:schemeClr val="accent6">
+              <a:lumMod val="75000"/>
+            </a:schemeClr>
+          </a:solidFill>
+        </p:spPr>
+        <p:style>
+          <a:lnRef idx="2">
+            <a:schemeClr val="accent1">
+              <a:shade val="50000"/>
+            </a:schemeClr>
+          </a:lnRef>
+          <a:fillRef idx="1">
+            <a:schemeClr val="accent1"/>
+          </a:fillRef>
+          <a:effectRef idx="0">
+            <a:schemeClr val="accent1"/>
+          </a:effectRef>
+          <a:fontRef idx="minor">
+            <a:schemeClr val="lt1"/>
+          </a:fontRef>
+        </p:style>
+        <p:txBody>
+          <a:bodyPr rtlCol="0" anchor="ctr"/>
+          <a:lstStyle/>
+          <a:p>
+            <a:pPr algn="ctr"/>
+            <a:endParaRPr lang="en-US"/>
+          </a:p>
+        </p:txBody>
+      </p:sp>
+      <p:sp>
+        <p:nvSpPr>
+          <p:cNvPr id="18" name="17 CuadroTexto"/>
+          <p:cNvSpPr txBox="1"/>
+          <p:nvPr/>
+        </p:nvSpPr>
+        <p:spPr>
+          <a:xfrm>
+            <a:off x="4419600" y="1905000"/>
+            <a:ext cx="997068" cy="369332"/>
+          </a:xfrm>
+          <a:prstGeom prst="rect">
+            <a:avLst/>
+          </a:prstGeom>
+          <a:noFill/>
+        </p:spPr>
+        <p:txBody>
+          <a:bodyPr wrap="none" rtlCol="0">
+            <a:spAutoFit/>
+          </a:bodyPr>
+          <a:lstStyle/>
+          <a:p>
+            <a:r>
+              <a:rPr lang="en-US" dirty="0" smtClean="0"/>
+              <a:t>message</a:t>
+            </a:r>
+            <a:endParaRPr lang="en-US" dirty="0"/>
+          </a:p>
+        </p:txBody>
+      </p:sp>
+    </p:spTree>
+  </p:cSld>
+  <p:clrMapOvr>
+    <a:masterClrMapping/>
+  </p:clrMapOvr>
+</p:sld>
+</file>
+
+<file path=ppt/slides/slide3.xml><?xml version="1.0" encoding="utf-8"?>
+<p:sld xmlns:a="http://schemas.openxmlformats.org/drawingml/2006/main" xmlns:r="http://schemas.openxmlformats.org/officeDocument/2006/relationships" xmlns:p="http://schemas.openxmlformats.org/presentationml/2006/main">
+  <p:cSld>
+    <p:spTree>
+      <p:nvGrpSpPr>
+        <p:cNvPr id="1" name=""/>
+        <p:cNvGrpSpPr/>
+        <p:nvPr/>
+      </p:nvGrpSpPr>
+      <p:grpSpPr>
+        <a:xfrm>
+          <a:off x="0" y="0"/>
+          <a:ext cx="0" cy="0"/>
+          <a:chOff x="0" y="0"/>
+          <a:chExt cx="0" cy="0"/>
+        </a:xfrm>
+      </p:grpSpPr>
+      <p:sp>
+        <p:nvSpPr>
+          <p:cNvPr id="2" name="1 Rectángulo redondeado"/>
+          <p:cNvSpPr/>
+          <p:nvPr/>
+        </p:nvSpPr>
+        <p:spPr>
+          <a:xfrm>
+            <a:off x="3733800" y="1371600"/>
+            <a:ext cx="1524000" cy="685801"/>
+          </a:xfrm>
+          <a:prstGeom prst="roundRect">
+            <a:avLst/>
+          </a:prstGeom>
+          <a:solidFill>
+            <a:schemeClr val="accent3">
+              <a:lumMod val="40000"/>
+              <a:lumOff val="60000"/>
+            </a:schemeClr>
+          </a:solidFill>
+        </p:spPr>
+        <p:style>
+          <a:lnRef idx="1">
+            <a:schemeClr val="accent3"/>
+          </a:lnRef>
+          <a:fillRef idx="2">
+            <a:schemeClr val="accent3"/>
+          </a:fillRef>
+          <a:effectRef idx="1">
+            <a:schemeClr val="accent3"/>
+          </a:effectRef>
+          <a:fontRef idx="minor">
+            <a:schemeClr val="dk1"/>
+          </a:fontRef>
+        </p:style>
+        <p:txBody>
+          <a:bodyPr rtlCol="0" anchor="ctr"/>
+          <a:lstStyle/>
+          <a:p>
+            <a:pPr algn="ctr"/>
+            <a:r>
+              <a:rPr lang="en-US" dirty="0" smtClean="0"/>
+              <a:t>supervisor</a:t>
+            </a:r>
+            <a:endParaRPr lang="en-US" dirty="0"/>
+          </a:p>
+        </p:txBody>
+      </p:sp>
+      <p:sp>
+        <p:nvSpPr>
+          <p:cNvPr id="3" name="2 Rectángulo redondeado"/>
+          <p:cNvSpPr/>
+          <p:nvPr/>
+        </p:nvSpPr>
+        <p:spPr>
+          <a:xfrm>
+            <a:off x="914400" y="3276600"/>
+            <a:ext cx="1524000" cy="685801"/>
+          </a:xfrm>
+          <a:prstGeom prst="roundRect">
+            <a:avLst/>
+          </a:prstGeom>
+          <a:solidFill>
+            <a:schemeClr val="accent3">
+              <a:lumMod val="40000"/>
+              <a:lumOff val="60000"/>
+            </a:schemeClr>
+          </a:solidFill>
+        </p:spPr>
+        <p:style>
+          <a:lnRef idx="1">
+            <a:schemeClr val="accent3"/>
+          </a:lnRef>
+          <a:fillRef idx="2">
+            <a:schemeClr val="accent3"/>
+          </a:fillRef>
+          <a:effectRef idx="1">
+            <a:schemeClr val="accent3"/>
+          </a:effectRef>
+          <a:fontRef idx="minor">
+            <a:schemeClr val="dk1"/>
+          </a:fontRef>
+        </p:style>
+        <p:txBody>
+          <a:bodyPr rtlCol="0" anchor="ctr"/>
+          <a:lstStyle/>
+          <a:p>
+            <a:pPr algn="ctr"/>
+            <a:r>
+              <a:rPr lang="en-US" dirty="0" smtClean="0"/>
+              <a:t>worker1</a:t>
+            </a:r>
+            <a:endParaRPr lang="en-US" dirty="0"/>
+          </a:p>
+        </p:txBody>
+      </p:sp>
+      <p:sp>
+        <p:nvSpPr>
+          <p:cNvPr id="4" name="3 Rectángulo redondeado"/>
+          <p:cNvSpPr/>
+          <p:nvPr/>
+        </p:nvSpPr>
+        <p:spPr>
+          <a:xfrm>
+            <a:off x="2819400" y="3276600"/>
+            <a:ext cx="1524000" cy="685801"/>
+          </a:xfrm>
+          <a:prstGeom prst="roundRect">
+            <a:avLst/>
+          </a:prstGeom>
+          <a:solidFill>
+            <a:schemeClr val="accent3">
+              <a:lumMod val="40000"/>
+              <a:lumOff val="60000"/>
+            </a:schemeClr>
+          </a:solidFill>
+        </p:spPr>
+        <p:style>
+          <a:lnRef idx="1">
+            <a:schemeClr val="accent3"/>
+          </a:lnRef>
+          <a:fillRef idx="2">
+            <a:schemeClr val="accent3"/>
+          </a:fillRef>
+          <a:effectRef idx="1">
+            <a:schemeClr val="accent3"/>
+          </a:effectRef>
+          <a:fontRef idx="minor">
+            <a:schemeClr val="dk1"/>
+          </a:fontRef>
+        </p:style>
+        <p:txBody>
+          <a:bodyPr rtlCol="0" anchor="ctr"/>
+          <a:lstStyle/>
+          <a:p>
+            <a:pPr algn="ctr"/>
+            <a:r>
+              <a:rPr lang="en-US" dirty="0" smtClean="0"/>
+              <a:t>worker2</a:t>
+            </a:r>
+            <a:endParaRPr lang="en-US" dirty="0"/>
+          </a:p>
+        </p:txBody>
+      </p:sp>
+      <p:sp>
+        <p:nvSpPr>
+          <p:cNvPr id="5" name="4 Rectángulo redondeado"/>
+          <p:cNvSpPr/>
+          <p:nvPr/>
+        </p:nvSpPr>
+        <p:spPr>
+          <a:xfrm>
+            <a:off x="4724400" y="3276600"/>
+            <a:ext cx="1524000" cy="685801"/>
+          </a:xfrm>
+          <a:prstGeom prst="roundRect">
+            <a:avLst/>
+          </a:prstGeom>
+          <a:solidFill>
+            <a:schemeClr val="accent3">
+              <a:lumMod val="40000"/>
+              <a:lumOff val="60000"/>
+            </a:schemeClr>
+          </a:solidFill>
+        </p:spPr>
+        <p:style>
+          <a:lnRef idx="1">
+            <a:schemeClr val="accent3"/>
+          </a:lnRef>
+          <a:fillRef idx="2">
+            <a:schemeClr val="accent3"/>
+          </a:fillRef>
+          <a:effectRef idx="1">
+            <a:schemeClr val="accent3"/>
+          </a:effectRef>
+          <a:fontRef idx="minor">
+            <a:schemeClr val="dk1"/>
+          </a:fontRef>
+        </p:style>
+        <p:txBody>
+          <a:bodyPr rtlCol="0" anchor="ctr"/>
+          <a:lstStyle/>
+          <a:p>
+            <a:pPr algn="ctr"/>
+            <a:r>
+              <a:rPr lang="en-US" dirty="0" smtClean="0"/>
+              <a:t>worker3</a:t>
+            </a:r>
+            <a:endParaRPr lang="en-US" dirty="0"/>
+          </a:p>
+        </p:txBody>
+      </p:sp>
+      <p:sp>
+        <p:nvSpPr>
+          <p:cNvPr id="6" name="5 Rectángulo redondeado"/>
+          <p:cNvSpPr/>
+          <p:nvPr/>
+        </p:nvSpPr>
+        <p:spPr>
+          <a:xfrm>
+            <a:off x="6629400" y="3276600"/>
+            <a:ext cx="1524000" cy="685801"/>
+          </a:xfrm>
+          <a:prstGeom prst="roundRect">
+            <a:avLst/>
+          </a:prstGeom>
+          <a:solidFill>
+            <a:schemeClr val="accent3">
+              <a:lumMod val="40000"/>
+              <a:lumOff val="60000"/>
+            </a:schemeClr>
+          </a:solidFill>
+        </p:spPr>
+        <p:style>
+          <a:lnRef idx="1">
+            <a:schemeClr val="accent3"/>
+          </a:lnRef>
+          <a:fillRef idx="2">
+            <a:schemeClr val="accent3"/>
+          </a:fillRef>
+          <a:effectRef idx="1">
+            <a:schemeClr val="accent3"/>
+          </a:effectRef>
+          <a:fontRef idx="minor">
+            <a:schemeClr val="dk1"/>
+          </a:fontRef>
+        </p:style>
+        <p:txBody>
+          <a:bodyPr rtlCol="0" anchor="ctr"/>
+          <a:lstStyle/>
+          <a:p>
+            <a:pPr algn="ctr"/>
+            <a:r>
+              <a:rPr lang="en-US" dirty="0" smtClean="0"/>
+              <a:t>worker4</a:t>
+            </a:r>
+            <a:endParaRPr lang="en-US" dirty="0"/>
+          </a:p>
+        </p:txBody>
+      </p:sp>
+      <p:cxnSp>
+        <p:nvCxnSpPr>
+          <p:cNvPr id="8" name="7 Conector recto de flecha"/>
+          <p:cNvCxnSpPr>
+            <a:stCxn id="2" idx="2"/>
+            <a:endCxn id="3" idx="0"/>
+          </p:cNvCxnSpPr>
+          <p:nvPr/>
+        </p:nvCxnSpPr>
+        <p:spPr>
+          <a:xfrm flipH="1">
+            <a:off x="1676400" y="2057401"/>
+            <a:ext cx="2819400" cy="1219199"/>
+          </a:xfrm>
+          <a:prstGeom prst="straightConnector1">
+            <a:avLst/>
+          </a:prstGeom>
+          <a:ln>
+            <a:tailEnd type="arrow"/>
+          </a:ln>
+        </p:spPr>
+        <p:style>
+          <a:lnRef idx="1">
+            <a:schemeClr val="accent1"/>
+          </a:lnRef>
+          <a:fillRef idx="0">
+            <a:schemeClr val="accent1"/>
+          </a:fillRef>
+          <a:effectRef idx="0">
+            <a:schemeClr val="accent1"/>
+          </a:effectRef>
+          <a:fontRef idx="minor">
+            <a:schemeClr val="tx1"/>
+          </a:fontRef>
+        </p:style>
+      </p:cxnSp>
+      <p:cxnSp>
+        <p:nvCxnSpPr>
+          <p:cNvPr id="10" name="9 Conector recto de flecha"/>
+          <p:cNvCxnSpPr>
+            <a:stCxn id="2" idx="2"/>
+            <a:endCxn id="4" idx="0"/>
+          </p:cNvCxnSpPr>
+          <p:nvPr/>
+        </p:nvCxnSpPr>
+        <p:spPr>
+          <a:xfrm flipH="1">
+            <a:off x="3581400" y="2057401"/>
+            <a:ext cx="914400" cy="1219199"/>
+          </a:xfrm>
+          <a:prstGeom prst="straightConnector1">
+            <a:avLst/>
+          </a:prstGeom>
+          <a:ln>
+            <a:tailEnd type="arrow"/>
+          </a:ln>
+        </p:spPr>
+        <p:style>
+          <a:lnRef idx="1">
+            <a:schemeClr val="accent1"/>
+          </a:lnRef>
+          <a:fillRef idx="0">
+            <a:schemeClr val="accent1"/>
+          </a:fillRef>
+          <a:effectRef idx="0">
+            <a:schemeClr val="accent1"/>
+          </a:effectRef>
+          <a:fontRef idx="minor">
+            <a:schemeClr val="tx1"/>
+          </a:fontRef>
+        </p:style>
+      </p:cxnSp>
+      <p:cxnSp>
+        <p:nvCxnSpPr>
+          <p:cNvPr id="12" name="11 Conector recto de flecha"/>
+          <p:cNvCxnSpPr>
+            <a:stCxn id="2" idx="2"/>
+            <a:endCxn id="5" idx="0"/>
+          </p:cNvCxnSpPr>
+          <p:nvPr/>
+        </p:nvCxnSpPr>
+        <p:spPr>
+          <a:xfrm>
+            <a:off x="4495800" y="2057401"/>
+            <a:ext cx="990600" cy="1219199"/>
+          </a:xfrm>
+          <a:prstGeom prst="straightConnector1">
+            <a:avLst/>
+          </a:prstGeom>
+          <a:ln>
+            <a:tailEnd type="arrow"/>
+          </a:ln>
+        </p:spPr>
+        <p:style>
+          <a:lnRef idx="1">
+            <a:schemeClr val="accent1"/>
+          </a:lnRef>
+          <a:fillRef idx="0">
+            <a:schemeClr val="accent1"/>
+          </a:fillRef>
+          <a:effectRef idx="0">
+            <a:schemeClr val="accent1"/>
+          </a:effectRef>
+          <a:fontRef idx="minor">
+            <a:schemeClr val="tx1"/>
+          </a:fontRef>
+        </p:style>
+      </p:cxnSp>
+      <p:cxnSp>
+        <p:nvCxnSpPr>
+          <p:cNvPr id="14" name="13 Conector recto de flecha"/>
+          <p:cNvCxnSpPr>
+            <a:stCxn id="2" idx="2"/>
+            <a:endCxn id="6" idx="0"/>
+          </p:cNvCxnSpPr>
+          <p:nvPr/>
+        </p:nvCxnSpPr>
+        <p:spPr>
+          <a:xfrm>
+            <a:off x="4495800" y="2057401"/>
+            <a:ext cx="2895600" cy="1219199"/>
           </a:xfrm>
           <a:prstGeom prst="straightConnector1">
             <a:avLst/>

</xml_diff>